<commit_message>
[docs] edit byeonghee introduce
S04P31A201-19
</commit_message>
<xml_diff>
--- a/docs/Introduce/SDS_자기소개_이병희.pptx
+++ b/docs/Introduce/SDS_자기소개_이병희.pptx
@@ -5,11 +5,12 @@
     <p:sldMasterId id="2147483648" r:id="rId1"/>
   </p:sldMasterIdLst>
   <p:notesMasterIdLst>
-    <p:notesMasterId r:id="rId4"/>
+    <p:notesMasterId r:id="rId5"/>
   </p:notesMasterIdLst>
   <p:sldIdLst>
-    <p:sldId id="270" r:id="rId2"/>
-    <p:sldId id="268" r:id="rId3"/>
+    <p:sldId id="271" r:id="rId2"/>
+    <p:sldId id="270" r:id="rId3"/>
+    <p:sldId id="268" r:id="rId4"/>
   </p:sldIdLst>
   <p:sldSz cx="12192000" cy="6858000"/>
   <p:notesSz cx="6858000" cy="9144000"/>
@@ -156,6 +157,7 @@
 <p1510:revInfo xmlns:a="http://schemas.openxmlformats.org/drawingml/2006/main" xmlns:r="http://schemas.openxmlformats.org/officeDocument/2006/relationships" xmlns:p1510="http://schemas.microsoft.com/office/powerpoint/2015/10/main">
   <p1510:revLst>
     <p1510:client id="{01839163-3EDC-4934-BDAB-4C74C22A9266}" v="839" dt="2021-04-13T05:21:20.162"/>
+    <p1510:client id="{8E3E1C62-E754-40CA-8767-D1ED0065B118}" v="698" dt="2021-04-13T12:40:57.544"/>
   </p1510:revLst>
 </p1510:revInfo>
 </file>
@@ -242,7 +244,7 @@
           <a:p>
             <a:fld id="{BB3E79AA-ED65-4529-8A7E-5E3F6023F7CD}" type="datetimeFigureOut">
               <a:rPr lang="ko-KR" altLang="en-US" smtClean="0"/>
-              <a:t>2021-04-12</a:t>
+              <a:t>2021-04-13</a:t>
             </a:fld>
             <a:endParaRPr lang="ko-KR" altLang="en-US"/>
           </a:p>
@@ -823,7 +825,7 @@
           <a:p>
             <a:fld id="{FF9B0850-4FCF-4EE2-B0F1-CA38F1722047}" type="slidenum">
               <a:rPr lang="ko-KR" altLang="en-US" smtClean="0"/>
-              <a:t>3</a:t>
+              <a:t>2</a:t>
             </a:fld>
             <a:endParaRPr lang="ko-KR" altLang="en-US"/>
           </a:p>
@@ -1156,7 +1158,7 @@
           <a:p>
             <a:fld id="{FF9B0850-4FCF-4EE2-B0F1-CA38F1722047}" type="slidenum">
               <a:rPr lang="ko-KR" altLang="en-US" smtClean="0"/>
-              <a:t>2</a:t>
+              <a:t>3</a:t>
             </a:fld>
             <a:endParaRPr lang="ko-KR" altLang="en-US"/>
           </a:p>
@@ -1310,7 +1312,7 @@
           <a:p>
             <a:fld id="{CAD0E02C-68E1-4A8C-8C14-81B47282B09C}" type="datetimeFigureOut">
               <a:rPr lang="ko-KR" altLang="en-US" smtClean="0"/>
-              <a:t>2021-04-12</a:t>
+              <a:t>2021-04-13</a:t>
             </a:fld>
             <a:endParaRPr lang="ko-KR" altLang="en-US"/>
           </a:p>
@@ -1585,7 +1587,7 @@
           <a:p>
             <a:fld id="{CAD0E02C-68E1-4A8C-8C14-81B47282B09C}" type="datetimeFigureOut">
               <a:rPr lang="ko-KR" altLang="en-US" smtClean="0"/>
-              <a:t>2021-04-12</a:t>
+              <a:t>2021-04-13</a:t>
             </a:fld>
             <a:endParaRPr lang="ko-KR" altLang="en-US"/>
           </a:p>
@@ -1837,7 +1839,7 @@
           <a:p>
             <a:fld id="{CAD0E02C-68E1-4A8C-8C14-81B47282B09C}" type="datetimeFigureOut">
               <a:rPr lang="ko-KR" altLang="en-US" smtClean="0"/>
-              <a:t>2021-04-12</a:t>
+              <a:t>2021-04-13</a:t>
             </a:fld>
             <a:endParaRPr lang="ko-KR" altLang="en-US"/>
           </a:p>
@@ -2005,7 +2007,7 @@
           <a:p>
             <a:fld id="{CAD0E02C-68E1-4A8C-8C14-81B47282B09C}" type="datetimeFigureOut">
               <a:rPr lang="ko-KR" altLang="en-US" smtClean="0"/>
-              <a:t>2021-04-12</a:t>
+              <a:t>2021-04-13</a:t>
             </a:fld>
             <a:endParaRPr lang="ko-KR" altLang="en-US"/>
           </a:p>
@@ -2183,7 +2185,7 @@
           <a:p>
             <a:fld id="{CAD0E02C-68E1-4A8C-8C14-81B47282B09C}" type="datetimeFigureOut">
               <a:rPr lang="ko-KR" altLang="en-US" smtClean="0"/>
-              <a:t>2021-04-12</a:t>
+              <a:t>2021-04-13</a:t>
             </a:fld>
             <a:endParaRPr lang="ko-KR" altLang="en-US"/>
           </a:p>
@@ -2909,7 +2911,7 @@
           <a:p>
             <a:fld id="{CAD0E02C-68E1-4A8C-8C14-81B47282B09C}" type="datetimeFigureOut">
               <a:rPr lang="ko-KR" altLang="en-US" smtClean="0"/>
-              <a:t>2021-04-12</a:t>
+              <a:t>2021-04-13</a:t>
             </a:fld>
             <a:endParaRPr lang="ko-KR" altLang="en-US"/>
           </a:p>
@@ -3077,7 +3079,7 @@
           <a:p>
             <a:fld id="{CAD0E02C-68E1-4A8C-8C14-81B47282B09C}" type="datetimeFigureOut">
               <a:rPr lang="ko-KR" altLang="en-US" smtClean="0"/>
-              <a:t>2021-04-12</a:t>
+              <a:t>2021-04-13</a:t>
             </a:fld>
             <a:endParaRPr lang="ko-KR" altLang="en-US"/>
           </a:p>
@@ -3322,7 +3324,7 @@
           <a:p>
             <a:fld id="{CAD0E02C-68E1-4A8C-8C14-81B47282B09C}" type="datetimeFigureOut">
               <a:rPr lang="ko-KR" altLang="en-US" smtClean="0"/>
-              <a:t>2021-04-12</a:t>
+              <a:t>2021-04-13</a:t>
             </a:fld>
             <a:endParaRPr lang="ko-KR" altLang="en-US"/>
           </a:p>
@@ -3551,7 +3553,7 @@
           <a:p>
             <a:fld id="{CAD0E02C-68E1-4A8C-8C14-81B47282B09C}" type="datetimeFigureOut">
               <a:rPr lang="ko-KR" altLang="en-US" smtClean="0"/>
-              <a:t>2021-04-12</a:t>
+              <a:t>2021-04-13</a:t>
             </a:fld>
             <a:endParaRPr lang="ko-KR" altLang="en-US"/>
           </a:p>
@@ -3915,7 +3917,7 @@
           <a:p>
             <a:fld id="{CAD0E02C-68E1-4A8C-8C14-81B47282B09C}" type="datetimeFigureOut">
               <a:rPr lang="ko-KR" altLang="en-US" smtClean="0"/>
-              <a:t>2021-04-12</a:t>
+              <a:t>2021-04-13</a:t>
             </a:fld>
             <a:endParaRPr lang="ko-KR" altLang="en-US"/>
           </a:p>
@@ -4032,7 +4034,7 @@
           <a:p>
             <a:fld id="{CAD0E02C-68E1-4A8C-8C14-81B47282B09C}" type="datetimeFigureOut">
               <a:rPr lang="ko-KR" altLang="en-US" smtClean="0"/>
-              <a:t>2021-04-12</a:t>
+              <a:t>2021-04-13</a:t>
             </a:fld>
             <a:endParaRPr lang="ko-KR" altLang="en-US"/>
           </a:p>
@@ -4243,7 +4245,7 @@
           <a:p>
             <a:fld id="{CAD0E02C-68E1-4A8C-8C14-81B47282B09C}" type="datetimeFigureOut">
               <a:rPr lang="ko-KR" altLang="en-US" smtClean="0"/>
-              <a:t>2021-04-12</a:t>
+              <a:t>2021-04-13</a:t>
             </a:fld>
             <a:endParaRPr lang="ko-KR" altLang="en-US"/>
           </a:p>
@@ -4653,7 +4655,13 @@
       </p:grpSpPr>
       <p:sp>
         <p:nvSpPr>
-          <p:cNvPr id="3" name="제목 2"/>
+          <p:cNvPr id="2" name="제목 1">
+            <a:extLst>
+              <a:ext uri="{FF2B5EF4-FFF2-40B4-BE49-F238E27FC236}">
+                <a16:creationId xmlns:a16="http://schemas.microsoft.com/office/drawing/2014/main" id="{3445313F-EF31-4C16-A340-F8871245C845}"/>
+              </a:ext>
+            </a:extLst>
+          </p:cNvPr>
           <p:cNvSpPr>
             <a:spLocks noGrp="1"/>
           </p:cNvSpPr>
@@ -4661,12 +4669,7 @@
             <p:ph type="title"/>
           </p:nvPr>
         </p:nvSpPr>
-        <p:spPr>
-          <a:xfrm>
-            <a:off x="1404589" y="782706"/>
-            <a:ext cx="7573156" cy="584735"/>
-          </a:xfrm>
-        </p:spPr>
+        <p:spPr/>
         <p:txBody>
           <a:bodyPr/>
           <a:lstStyle/>
@@ -4675,14 +4678,21 @@
               <a:rPr lang="ko-KR" altLang="en-US">
                 <a:ea typeface="삼성긴고딕OTF Medium"/>
               </a:rPr>
-              <a:t>공통 프로젝트 - MuShRoom</a:t>
-            </a:r>
-          </a:p>
-        </p:txBody>
-      </p:sp>
-      <p:sp>
-        <p:nvSpPr>
-          <p:cNvPr id="2" name="모서리가 둥근 직사각형 1"/>
+              <a:t>SSAFY 4기 이병희</a:t>
+            </a:r>
+            <a:endParaRPr lang="ko-KR" altLang="en-US"/>
+          </a:p>
+        </p:txBody>
+      </p:sp>
+      <p:sp>
+        <p:nvSpPr>
+          <p:cNvPr id="4" name="모서리가 둥근 직사각형 1">
+            <a:extLst>
+              <a:ext uri="{FF2B5EF4-FFF2-40B4-BE49-F238E27FC236}">
+                <a16:creationId xmlns:a16="http://schemas.microsoft.com/office/drawing/2014/main" id="{FDF572E5-F47E-4A69-B6AB-E1AEC2ED45E9}"/>
+              </a:ext>
+            </a:extLst>
+          </p:cNvPr>
           <p:cNvSpPr/>
           <p:nvPr/>
         </p:nvSpPr>
@@ -4718,26 +4728,37 @@
           </a:fontRef>
         </p:style>
         <p:txBody>
-          <a:bodyPr rtlCol="0" anchor="ctr"/>
+          <a:bodyPr lIns="91440" tIns="45720" rIns="91440" bIns="45720" rtlCol="0" anchor="ctr"/>
           <a:lstStyle/>
           <a:p>
             <a:pPr algn="ctr"/>
             <a:r>
-              <a:rPr lang="ko-KR" altLang="en-US" sz="1600" b="1" dirty="0"/>
-              <a:t>프로젝트 주제</a:t>
-            </a:r>
-          </a:p>
-        </p:txBody>
-      </p:sp>
-      <p:sp>
-        <p:nvSpPr>
-          <p:cNvPr id="21" name="모서리가 둥근 직사각형 20"/>
+              <a:rPr lang="ko-KR" altLang="en-US" sz="1600" b="1">
+                <a:ea typeface="맑은 고딕"/>
+              </a:rPr>
+              <a:t>전공</a:t>
+            </a:r>
+            <a:endParaRPr lang="ko-KR" altLang="en-US" sz="1600" b="1" dirty="0">
+              <a:ea typeface="맑은 고딕"/>
+            </a:endParaRPr>
+          </a:p>
+        </p:txBody>
+      </p:sp>
+      <p:sp>
+        <p:nvSpPr>
+          <p:cNvPr id="6" name="모서리가 둥근 직사각형 20">
+            <a:extLst>
+              <a:ext uri="{FF2B5EF4-FFF2-40B4-BE49-F238E27FC236}">
+                <a16:creationId xmlns:a16="http://schemas.microsoft.com/office/drawing/2014/main" id="{EE15A50F-23FA-45D9-9C51-1A9AAACAE936}"/>
+              </a:ext>
+            </a:extLst>
+          </p:cNvPr>
           <p:cNvSpPr/>
           <p:nvPr/>
         </p:nvSpPr>
         <p:spPr>
           <a:xfrm>
-            <a:off x="1025234" y="3464941"/>
+            <a:off x="1025234" y="3187035"/>
             <a:ext cx="1884219" cy="429491"/>
           </a:xfrm>
           <a:prstGeom prst="roundRect">
@@ -4767,23 +4788,85 @@
           </a:fontRef>
         </p:style>
         <p:txBody>
-          <a:bodyPr rtlCol="0" anchor="ctr"/>
+          <a:bodyPr lIns="91440" tIns="45720" rIns="91440" bIns="45720" rtlCol="0" anchor="ctr"/>
           <a:lstStyle/>
           <a:p>
             <a:pPr algn="ctr"/>
             <a:r>
-              <a:rPr lang="ko-KR" altLang="en-US" sz="1600" b="1" dirty="0"/>
-              <a:t>기획의도</a:t>
-            </a:r>
-          </a:p>
-        </p:txBody>
-      </p:sp>
-      <p:sp>
-        <p:nvSpPr>
-          <p:cNvPr id="5" name="TextBox 4">
+              <a:rPr lang="ko-KR" altLang="en-US" sz="1600" b="1">
+                <a:ea typeface="맑은 고딕"/>
+              </a:rPr>
+              <a:t>선택 이유</a:t>
+            </a:r>
+            <a:endParaRPr lang="ko-KR" altLang="en-US" sz="1600" b="1" dirty="0">
+              <a:ea typeface="맑은 고딕"/>
+            </a:endParaRPr>
+          </a:p>
+        </p:txBody>
+      </p:sp>
+      <p:sp>
+        <p:nvSpPr>
+          <p:cNvPr id="8" name="모서리가 둥근 직사각형 20">
             <a:extLst>
               <a:ext uri="{FF2B5EF4-FFF2-40B4-BE49-F238E27FC236}">
-                <a16:creationId xmlns:a16="http://schemas.microsoft.com/office/drawing/2014/main" id="{91EEC506-DD63-4868-A786-9987D2F9FE7B}"/>
+                <a16:creationId xmlns:a16="http://schemas.microsoft.com/office/drawing/2014/main" id="{41644EB9-8C48-48C4-8215-5FBB29225673}"/>
+              </a:ext>
+            </a:extLst>
+          </p:cNvPr>
+          <p:cNvSpPr/>
+          <p:nvPr/>
+        </p:nvSpPr>
+        <p:spPr>
+          <a:xfrm>
+            <a:off x="1025234" y="4845505"/>
+            <a:ext cx="1884219" cy="429491"/>
+          </a:xfrm>
+          <a:prstGeom prst="roundRect">
+            <a:avLst/>
+          </a:prstGeom>
+          <a:solidFill>
+            <a:srgbClr val="00B050"/>
+          </a:solidFill>
+          <a:ln>
+            <a:noFill/>
+          </a:ln>
+        </p:spPr>
+        <p:style>
+          <a:lnRef idx="2">
+            <a:schemeClr val="accent1">
+              <a:shade val="50000"/>
+            </a:schemeClr>
+          </a:lnRef>
+          <a:fillRef idx="1">
+            <a:schemeClr val="accent1"/>
+          </a:fillRef>
+          <a:effectRef idx="0">
+            <a:schemeClr val="accent1"/>
+          </a:effectRef>
+          <a:fontRef idx="minor">
+            <a:schemeClr val="lt1"/>
+          </a:fontRef>
+        </p:style>
+        <p:txBody>
+          <a:bodyPr lIns="91440" tIns="45720" rIns="91440" bIns="45720" rtlCol="0" anchor="ctr"/>
+          <a:lstStyle/>
+          <a:p>
+            <a:pPr algn="ctr"/>
+            <a:r>
+              <a:rPr lang="ko-KR" altLang="en-US" sz="1600" b="1">
+                <a:ea typeface="맑은 고딕"/>
+              </a:rPr>
+              <a:t>얻고 싶은 것</a:t>
+            </a:r>
+          </a:p>
+        </p:txBody>
+      </p:sp>
+      <p:sp>
+        <p:nvSpPr>
+          <p:cNvPr id="10" name="TextBox 9">
+            <a:extLst>
+              <a:ext uri="{FF2B5EF4-FFF2-40B4-BE49-F238E27FC236}">
+                <a16:creationId xmlns:a16="http://schemas.microsoft.com/office/drawing/2014/main" id="{E3DE6070-5F94-4FC1-9C0E-02E0A56EF04E}"/>
               </a:ext>
             </a:extLst>
           </p:cNvPr>
@@ -4813,7 +4896,7 @@
               <a:rPr lang="ko-KR" altLang="en-US">
                 <a:ea typeface="맑은 고딕"/>
               </a:rPr>
-              <a:t>- 언택트 음악 공유 플랫폼</a:t>
+              <a:t>- 컴퓨터공학과</a:t>
             </a:r>
             <a:endParaRPr lang="ko-KR" altLang="en-US" dirty="0">
               <a:ea typeface="맑은 고딕"/>
@@ -4823,10 +4906,10 @@
       </p:sp>
       <p:sp>
         <p:nvSpPr>
-          <p:cNvPr id="9" name="TextBox 8">
+          <p:cNvPr id="12" name="TextBox 11">
             <a:extLst>
               <a:ext uri="{FF2B5EF4-FFF2-40B4-BE49-F238E27FC236}">
-                <a16:creationId xmlns:a16="http://schemas.microsoft.com/office/drawing/2014/main" id="{2DC85AE4-C8DD-4636-BB8C-B82A55596E74}"/>
+                <a16:creationId xmlns:a16="http://schemas.microsoft.com/office/drawing/2014/main" id="{32CB5EC4-CAEA-42A1-8271-5F9251E3999C}"/>
               </a:ext>
             </a:extLst>
           </p:cNvPr>
@@ -4835,8 +4918,8 @@
         </p:nvSpPr>
         <p:spPr>
           <a:xfrm>
-            <a:off x="986117" y="4123764"/>
-            <a:ext cx="5154705" cy="646331"/>
+            <a:off x="959223" y="3720352"/>
+            <a:ext cx="10524563" cy="923330"/>
           </a:xfrm>
           <a:prstGeom prst="rect">
             <a:avLst/>
@@ -4853,77 +4936,109 @@
           <a:lstStyle/>
           <a:p>
             <a:r>
+              <a:rPr lang="en-US" altLang="en-US">
+                <a:ea typeface="+mn-lt"/>
+                <a:cs typeface="+mn-lt"/>
+              </a:rPr>
+              <a:t>-</a:t>
+            </a:r>
+            <a:r>
               <a:rPr lang="ko-KR" altLang="en-US">
-                <a:ea typeface="맑은 고딕"/>
+                <a:ea typeface="+mn-lt"/>
+                <a:cs typeface="+mn-lt"/>
               </a:rPr>
-              <a:t>- 언택트 시대에 비대면으로 음악 작업 가능</a:t>
-            </a:r>
-            <a:br>
-              <a:rPr lang="ko-KR" altLang="en-US" dirty="0">
-                <a:ea typeface="맑은 고딕"/>
+              <a:t> 대기업이 사용하는 기술 및 아키텍쳐 간접적으로 체험</a:t>
+            </a:r>
+            <a:endParaRPr lang="ko-KR" dirty="0">
+              <a:ea typeface="맑은 고딕" panose="020B0503020000020004" pitchFamily="34" charset="-127"/>
+              <a:cs typeface="+mn-lt"/>
+            </a:endParaRPr>
+          </a:p>
+          <a:p>
+            <a:r>
+              <a:rPr lang="ko-KR" altLang="en-US">
+                <a:ea typeface="+mn-lt"/>
+                <a:cs typeface="+mn-lt"/>
               </a:rPr>
-            </a:br>
-            <a:r>
-              <a:rPr lang="ko-KR" altLang="en-US" dirty="0">
-                <a:ea typeface="맑은 고딕"/>
+              <a:t>- 유닛 테스트는 어느 분야에서도 필수적</a:t>
+            </a:r>
+            <a:endParaRPr lang="ko-KR" altLang="en-US" dirty="0">
+              <a:ea typeface="+mn-lt"/>
+              <a:cs typeface="+mn-lt"/>
+            </a:endParaRPr>
+          </a:p>
+          <a:p>
+            <a:r>
+              <a:rPr lang="en-US" altLang="en-US" dirty="0">
+                <a:ea typeface="+mn-lt"/>
+                <a:cs typeface="+mn-lt"/>
               </a:rPr>
-              <a:t>- 지인들과 함께 간단히 즐길 수 있는 음악 공유</a:t>
-            </a:r>
-          </a:p>
-        </p:txBody>
-      </p:sp>
-      <p:pic>
-        <p:nvPicPr>
-          <p:cNvPr id="6" name="그림 7">
+              <a:t>-</a:t>
+            </a:r>
+            <a:r>
+              <a:rPr lang="ko-KR" altLang="en-US">
+                <a:ea typeface="+mn-lt"/>
+                <a:cs typeface="+mn-lt"/>
+              </a:rPr>
+              <a:t> 현업에 종사하시고 계신 멘토님의 멘토링</a:t>
+            </a:r>
+            <a:endParaRPr lang="ko-KR">
+              <a:ea typeface="맑은 고딕"/>
+            </a:endParaRPr>
+          </a:p>
+        </p:txBody>
+      </p:sp>
+      <p:sp>
+        <p:nvSpPr>
+          <p:cNvPr id="14" name="TextBox 13">
             <a:extLst>
               <a:ext uri="{FF2B5EF4-FFF2-40B4-BE49-F238E27FC236}">
-                <a16:creationId xmlns:a16="http://schemas.microsoft.com/office/drawing/2014/main" id="{3D66ADC3-9D15-46B1-9CA1-DECA58B2C947}"/>
+                <a16:creationId xmlns:a16="http://schemas.microsoft.com/office/drawing/2014/main" id="{EDB6BD40-08CD-478C-A31F-187EF0545D7F}"/>
               </a:ext>
             </a:extLst>
           </p:cNvPr>
-          <p:cNvPicPr>
-            <a:picLocks noChangeAspect="1"/>
-          </p:cNvPicPr>
+          <p:cNvSpPr txBox="1"/>
           <p:nvPr/>
-        </p:nvPicPr>
-        <p:blipFill>
-          <a:blip r:embed="rId3"/>
-          <a:stretch>
-            <a:fillRect/>
-          </a:stretch>
-        </p:blipFill>
+        </p:nvSpPr>
         <p:spPr>
           <a:xfrm>
-            <a:off x="6095999" y="2470967"/>
-            <a:ext cx="5585010" cy="2704960"/>
+            <a:off x="959223" y="5441575"/>
+            <a:ext cx="8901952" cy="369332"/>
           </a:xfrm>
           <a:prstGeom prst="rect">
             <a:avLst/>
           </a:prstGeom>
+          <a:noFill/>
         </p:spPr>
-      </p:pic>
+        <p:txBody>
+          <a:bodyPr rot="0" spcFirstLastPara="0" vertOverflow="overflow" horzOverflow="overflow" vert="horz" wrap="square" lIns="91440" tIns="45720" rIns="91440" bIns="45720" numCol="1" spcCol="0" rtlCol="0" fromWordArt="0" anchor="t" anchorCtr="0" forceAA="0" compatLnSpc="1">
+            <a:prstTxWarp prst="textNoShape">
+              <a:avLst/>
+            </a:prstTxWarp>
+            <a:spAutoFit/>
+          </a:bodyPr>
+          <a:lstStyle/>
+          <a:p>
+            <a:r>
+              <a:rPr lang="ko-KR" altLang="en-US">
+                <a:ea typeface="맑은 고딕"/>
+              </a:rPr>
+              <a:t>- 유닛 테스트를 개발하면서 많은 경험을 쌓고 싶습니다!</a:t>
+            </a:r>
+            <a:endParaRPr lang="ko-KR"/>
+          </a:p>
+        </p:txBody>
+      </p:sp>
     </p:spTree>
     <p:extLst>
       <p:ext uri="{BB962C8B-B14F-4D97-AF65-F5344CB8AC3E}">
-        <p14:creationId xmlns:p14="http://schemas.microsoft.com/office/powerpoint/2010/main" val="1459313899"/>
+        <p14:creationId xmlns:p14="http://schemas.microsoft.com/office/powerpoint/2010/main" val="3357180261"/>
       </p:ext>
     </p:extLst>
   </p:cSld>
   <p:clrMapOvr>
     <a:masterClrMapping/>
   </p:clrMapOvr>
-  <mc:AlternateContent xmlns:mc="http://schemas.openxmlformats.org/markup-compatibility/2006" xmlns:p14="http://schemas.microsoft.com/office/powerpoint/2010/main">
-    <mc:Choice Requires="p14">
-      <p:transition spd="med" p14:dur="700">
-        <p:fade/>
-      </p:transition>
-    </mc:Choice>
-    <mc:Fallback xmlns="">
-      <p:transition spd="med">
-        <p:fade/>
-      </p:transition>
-    </mc:Fallback>
-  </mc:AlternateContent>
 </p:sld>
 </file>
 
@@ -4968,9 +5083,8 @@
               <a:rPr lang="ko-KR" altLang="en-US">
                 <a:ea typeface="삼성긴고딕OTF Medium"/>
               </a:rPr>
-              <a:t>특화 프로젝트 - 잇다</a:t>
-            </a:r>
-            <a:endParaRPr lang="ko-KR" altLang="en-US"/>
+              <a:t>공통 프로젝트 - MuShRoom</a:t>
+            </a:r>
           </a:p>
         </p:txBody>
       </p:sp>
@@ -5031,7 +5145,7 @@
         </p:nvSpPr>
         <p:spPr>
           <a:xfrm>
-            <a:off x="1025234" y="3439197"/>
+            <a:off x="1025234" y="3187035"/>
             <a:ext cx="1884219" cy="429491"/>
           </a:xfrm>
           <a:prstGeom prst="roundRect">
@@ -5074,6 +5188,419 @@
       </p:sp>
       <p:sp>
         <p:nvSpPr>
+          <p:cNvPr id="5" name="TextBox 4">
+            <a:extLst>
+              <a:ext uri="{FF2B5EF4-FFF2-40B4-BE49-F238E27FC236}">
+                <a16:creationId xmlns:a16="http://schemas.microsoft.com/office/drawing/2014/main" id="{91EEC506-DD63-4868-A786-9987D2F9FE7B}"/>
+              </a:ext>
+            </a:extLst>
+          </p:cNvPr>
+          <p:cNvSpPr txBox="1"/>
+          <p:nvPr/>
+        </p:nvSpPr>
+        <p:spPr>
+          <a:xfrm>
+            <a:off x="959223" y="2590800"/>
+            <a:ext cx="4347882" cy="369332"/>
+          </a:xfrm>
+          <a:prstGeom prst="rect">
+            <a:avLst/>
+          </a:prstGeom>
+          <a:noFill/>
+        </p:spPr>
+        <p:txBody>
+          <a:bodyPr rot="0" spcFirstLastPara="0" vertOverflow="overflow" horzOverflow="overflow" vert="horz" wrap="square" lIns="91440" tIns="45720" rIns="91440" bIns="45720" numCol="1" spcCol="0" rtlCol="0" fromWordArt="0" anchor="t" anchorCtr="0" forceAA="0" compatLnSpc="1">
+            <a:prstTxWarp prst="textNoShape">
+              <a:avLst/>
+            </a:prstTxWarp>
+            <a:spAutoFit/>
+          </a:bodyPr>
+          <a:lstStyle/>
+          <a:p>
+            <a:r>
+              <a:rPr lang="ko-KR" altLang="en-US">
+                <a:ea typeface="맑은 고딕"/>
+              </a:rPr>
+              <a:t>- 언택트 음악 공유 플랫폼</a:t>
+            </a:r>
+            <a:endParaRPr lang="ko-KR" altLang="en-US" dirty="0">
+              <a:ea typeface="맑은 고딕"/>
+            </a:endParaRPr>
+          </a:p>
+        </p:txBody>
+      </p:sp>
+      <p:sp>
+        <p:nvSpPr>
+          <p:cNvPr id="9" name="TextBox 8">
+            <a:extLst>
+              <a:ext uri="{FF2B5EF4-FFF2-40B4-BE49-F238E27FC236}">
+                <a16:creationId xmlns:a16="http://schemas.microsoft.com/office/drawing/2014/main" id="{2DC85AE4-C8DD-4636-BB8C-B82A55596E74}"/>
+              </a:ext>
+            </a:extLst>
+          </p:cNvPr>
+          <p:cNvSpPr txBox="1"/>
+          <p:nvPr/>
+        </p:nvSpPr>
+        <p:spPr>
+          <a:xfrm>
+            <a:off x="959223" y="3720352"/>
+            <a:ext cx="5154705" cy="646331"/>
+          </a:xfrm>
+          <a:prstGeom prst="rect">
+            <a:avLst/>
+          </a:prstGeom>
+          <a:noFill/>
+        </p:spPr>
+        <p:txBody>
+          <a:bodyPr rot="0" spcFirstLastPara="0" vertOverflow="overflow" horzOverflow="overflow" vert="horz" wrap="square" lIns="91440" tIns="45720" rIns="91440" bIns="45720" numCol="1" spcCol="0" rtlCol="0" fromWordArt="0" anchor="t" anchorCtr="0" forceAA="0" compatLnSpc="1">
+            <a:prstTxWarp prst="textNoShape">
+              <a:avLst/>
+            </a:prstTxWarp>
+            <a:spAutoFit/>
+          </a:bodyPr>
+          <a:lstStyle/>
+          <a:p>
+            <a:r>
+              <a:rPr lang="ko-KR" altLang="en-US">
+                <a:ea typeface="맑은 고딕"/>
+              </a:rPr>
+              <a:t>- 언택트 시대에 비대면으로 음악 작업 가능</a:t>
+            </a:r>
+            <a:br>
+              <a:rPr lang="ko-KR" altLang="en-US" dirty="0">
+                <a:ea typeface="맑은 고딕"/>
+              </a:rPr>
+            </a:br>
+            <a:r>
+              <a:rPr lang="ko-KR" altLang="en-US" dirty="0">
+                <a:ea typeface="맑은 고딕"/>
+              </a:rPr>
+              <a:t>- 지인들과 함께 간단히 즐길 수 있는 음악 공유</a:t>
+            </a:r>
+          </a:p>
+        </p:txBody>
+      </p:sp>
+      <p:pic>
+        <p:nvPicPr>
+          <p:cNvPr id="6" name="그림 7">
+            <a:extLst>
+              <a:ext uri="{FF2B5EF4-FFF2-40B4-BE49-F238E27FC236}">
+                <a16:creationId xmlns:a16="http://schemas.microsoft.com/office/drawing/2014/main" id="{3D66ADC3-9D15-46B1-9CA1-DECA58B2C947}"/>
+              </a:ext>
+            </a:extLst>
+          </p:cNvPr>
+          <p:cNvPicPr>
+            <a:picLocks noChangeAspect="1"/>
+          </p:cNvPicPr>
+          <p:nvPr/>
+        </p:nvPicPr>
+        <p:blipFill>
+          <a:blip r:embed="rId3"/>
+          <a:stretch>
+            <a:fillRect/>
+          </a:stretch>
+        </p:blipFill>
+        <p:spPr>
+          <a:xfrm>
+            <a:off x="6095999" y="2470967"/>
+            <a:ext cx="5585010" cy="2704960"/>
+          </a:xfrm>
+          <a:prstGeom prst="rect">
+            <a:avLst/>
+          </a:prstGeom>
+        </p:spPr>
+      </p:pic>
+      <p:sp>
+        <p:nvSpPr>
+          <p:cNvPr id="8" name="모서리가 둥근 직사각형 20">
+            <a:extLst>
+              <a:ext uri="{FF2B5EF4-FFF2-40B4-BE49-F238E27FC236}">
+                <a16:creationId xmlns:a16="http://schemas.microsoft.com/office/drawing/2014/main" id="{499EAB51-1E86-45FC-B3FD-2F9A2BB2028E}"/>
+              </a:ext>
+            </a:extLst>
+          </p:cNvPr>
+          <p:cNvSpPr/>
+          <p:nvPr/>
+        </p:nvSpPr>
+        <p:spPr>
+          <a:xfrm>
+            <a:off x="1025234" y="4603458"/>
+            <a:ext cx="1884219" cy="429491"/>
+          </a:xfrm>
+          <a:prstGeom prst="roundRect">
+            <a:avLst/>
+          </a:prstGeom>
+          <a:solidFill>
+            <a:srgbClr val="00B050"/>
+          </a:solidFill>
+          <a:ln>
+            <a:noFill/>
+          </a:ln>
+        </p:spPr>
+        <p:style>
+          <a:lnRef idx="2">
+            <a:schemeClr val="accent1">
+              <a:shade val="50000"/>
+            </a:schemeClr>
+          </a:lnRef>
+          <a:fillRef idx="1">
+            <a:schemeClr val="accent1"/>
+          </a:fillRef>
+          <a:effectRef idx="0">
+            <a:schemeClr val="accent1"/>
+          </a:effectRef>
+          <a:fontRef idx="minor">
+            <a:schemeClr val="lt1"/>
+          </a:fontRef>
+        </p:style>
+        <p:txBody>
+          <a:bodyPr lIns="91440" tIns="45720" rIns="91440" bIns="45720" rtlCol="0" anchor="ctr"/>
+          <a:lstStyle/>
+          <a:p>
+            <a:pPr algn="ctr"/>
+            <a:r>
+              <a:rPr lang="ko-KR" altLang="en-US" sz="1600" b="1" dirty="0">
+                <a:ea typeface="맑은 고딕"/>
+              </a:rPr>
+              <a:t>역할</a:t>
+            </a:r>
+          </a:p>
+        </p:txBody>
+      </p:sp>
+      <p:sp>
+        <p:nvSpPr>
+          <p:cNvPr id="10" name="TextBox 9">
+            <a:extLst>
+              <a:ext uri="{FF2B5EF4-FFF2-40B4-BE49-F238E27FC236}">
+                <a16:creationId xmlns:a16="http://schemas.microsoft.com/office/drawing/2014/main" id="{055FDA34-48A7-4E42-925B-C29A09EDA7A1}"/>
+              </a:ext>
+            </a:extLst>
+          </p:cNvPr>
+          <p:cNvSpPr txBox="1"/>
+          <p:nvPr/>
+        </p:nvSpPr>
+        <p:spPr>
+          <a:xfrm>
+            <a:off x="959223" y="5199528"/>
+            <a:ext cx="5154705" cy="923330"/>
+          </a:xfrm>
+          <a:prstGeom prst="rect">
+            <a:avLst/>
+          </a:prstGeom>
+          <a:noFill/>
+        </p:spPr>
+        <p:txBody>
+          <a:bodyPr rot="0" spcFirstLastPara="0" vertOverflow="overflow" horzOverflow="overflow" vert="horz" wrap="square" lIns="91440" tIns="45720" rIns="91440" bIns="45720" numCol="1" spcCol="0" rtlCol="0" fromWordArt="0" anchor="t" anchorCtr="0" forceAA="0" compatLnSpc="1">
+            <a:prstTxWarp prst="textNoShape">
+              <a:avLst/>
+            </a:prstTxWarp>
+            <a:spAutoFit/>
+          </a:bodyPr>
+          <a:lstStyle/>
+          <a:p>
+            <a:r>
+              <a:rPr lang="ko-KR">
+                <a:ea typeface="+mn-lt"/>
+                <a:cs typeface="+mn-lt"/>
+              </a:rPr>
+              <a:t>- Vue.js, vuex를 사용한 프론트 개발</a:t>
+            </a:r>
+            <a:endParaRPr lang="ko-KR"/>
+          </a:p>
+          <a:p>
+            <a:r>
+              <a:rPr lang="ko-KR">
+                <a:ea typeface="+mn-lt"/>
+                <a:cs typeface="+mn-lt"/>
+              </a:rPr>
+              <a:t>- 공유 룸 ID 공유 방식 설계 및 구현</a:t>
+            </a:r>
+            <a:endParaRPr lang="ko-KR"/>
+          </a:p>
+          <a:p>
+            <a:r>
+              <a:rPr lang="ko-KR">
+                <a:ea typeface="+mn-lt"/>
+                <a:cs typeface="+mn-lt"/>
+              </a:rPr>
+              <a:t>- Websocket을 사용한 실시간 음악 공유</a:t>
+            </a:r>
+            <a:endParaRPr lang="ko-KR"/>
+          </a:p>
+        </p:txBody>
+      </p:sp>
+    </p:spTree>
+    <p:extLst>
+      <p:ext uri="{BB962C8B-B14F-4D97-AF65-F5344CB8AC3E}">
+        <p14:creationId xmlns:p14="http://schemas.microsoft.com/office/powerpoint/2010/main" val="1459313899"/>
+      </p:ext>
+    </p:extLst>
+  </p:cSld>
+  <p:clrMapOvr>
+    <a:masterClrMapping/>
+  </p:clrMapOvr>
+  <mc:AlternateContent xmlns:mc="http://schemas.openxmlformats.org/markup-compatibility/2006" xmlns:p14="http://schemas.microsoft.com/office/powerpoint/2010/main">
+    <mc:Choice Requires="p14">
+      <p:transition spd="med" p14:dur="700">
+        <p:fade/>
+      </p:transition>
+    </mc:Choice>
+    <mc:Fallback xmlns="">
+      <p:transition spd="med">
+        <p:fade/>
+      </p:transition>
+    </mc:Fallback>
+  </mc:AlternateContent>
+</p:sld>
+</file>
+
+<file path=ppt/slides/slide3.xml><?xml version="1.0" encoding="utf-8"?>
+<p:sld xmlns:a="http://schemas.openxmlformats.org/drawingml/2006/main" xmlns:r="http://schemas.openxmlformats.org/officeDocument/2006/relationships" xmlns:p="http://schemas.openxmlformats.org/presentationml/2006/main">
+  <p:cSld>
+    <p:spTree>
+      <p:nvGrpSpPr>
+        <p:cNvPr id="1" name=""/>
+        <p:cNvGrpSpPr/>
+        <p:nvPr/>
+      </p:nvGrpSpPr>
+      <p:grpSpPr>
+        <a:xfrm>
+          <a:off x="0" y="0"/>
+          <a:ext cx="0" cy="0"/>
+          <a:chOff x="0" y="0"/>
+          <a:chExt cx="0" cy="0"/>
+        </a:xfrm>
+      </p:grpSpPr>
+      <p:sp>
+        <p:nvSpPr>
+          <p:cNvPr id="3" name="제목 2"/>
+          <p:cNvSpPr>
+            <a:spLocks noGrp="1"/>
+          </p:cNvSpPr>
+          <p:nvPr>
+            <p:ph type="title"/>
+          </p:nvPr>
+        </p:nvSpPr>
+        <p:spPr>
+          <a:xfrm>
+            <a:off x="1404589" y="782706"/>
+            <a:ext cx="7573156" cy="584735"/>
+          </a:xfrm>
+        </p:spPr>
+        <p:txBody>
+          <a:bodyPr/>
+          <a:lstStyle/>
+          <a:p>
+            <a:r>
+              <a:rPr lang="ko-KR" altLang="en-US">
+                <a:ea typeface="삼성긴고딕OTF Medium"/>
+              </a:rPr>
+              <a:t>특화 프로젝트 - 잇다</a:t>
+            </a:r>
+            <a:endParaRPr lang="ko-KR" altLang="en-US"/>
+          </a:p>
+        </p:txBody>
+      </p:sp>
+      <p:sp>
+        <p:nvSpPr>
+          <p:cNvPr id="2" name="모서리가 둥근 직사각형 1"/>
+          <p:cNvSpPr/>
+          <p:nvPr/>
+        </p:nvSpPr>
+        <p:spPr>
+          <a:xfrm>
+            <a:off x="1025235" y="2071254"/>
+            <a:ext cx="1884219" cy="429491"/>
+          </a:xfrm>
+          <a:prstGeom prst="roundRect">
+            <a:avLst/>
+          </a:prstGeom>
+          <a:solidFill>
+            <a:srgbClr val="00B050"/>
+          </a:solidFill>
+          <a:ln>
+            <a:noFill/>
+          </a:ln>
+        </p:spPr>
+        <p:style>
+          <a:lnRef idx="2">
+            <a:schemeClr val="accent1">
+              <a:shade val="50000"/>
+            </a:schemeClr>
+          </a:lnRef>
+          <a:fillRef idx="1">
+            <a:schemeClr val="accent1"/>
+          </a:fillRef>
+          <a:effectRef idx="0">
+            <a:schemeClr val="accent1"/>
+          </a:effectRef>
+          <a:fontRef idx="minor">
+            <a:schemeClr val="lt1"/>
+          </a:fontRef>
+        </p:style>
+        <p:txBody>
+          <a:bodyPr rtlCol="0" anchor="ctr"/>
+          <a:lstStyle/>
+          <a:p>
+            <a:pPr algn="ctr"/>
+            <a:r>
+              <a:rPr lang="ko-KR" altLang="en-US" sz="1600" b="1" dirty="0"/>
+              <a:t>프로젝트 주제</a:t>
+            </a:r>
+          </a:p>
+        </p:txBody>
+      </p:sp>
+      <p:sp>
+        <p:nvSpPr>
+          <p:cNvPr id="21" name="모서리가 둥근 직사각형 20"/>
+          <p:cNvSpPr/>
+          <p:nvPr/>
+        </p:nvSpPr>
+        <p:spPr>
+          <a:xfrm>
+            <a:off x="1025234" y="3134397"/>
+            <a:ext cx="1884219" cy="429491"/>
+          </a:xfrm>
+          <a:prstGeom prst="roundRect">
+            <a:avLst/>
+          </a:prstGeom>
+          <a:solidFill>
+            <a:srgbClr val="00B050"/>
+          </a:solidFill>
+          <a:ln>
+            <a:noFill/>
+          </a:ln>
+        </p:spPr>
+        <p:style>
+          <a:lnRef idx="2">
+            <a:schemeClr val="accent1">
+              <a:shade val="50000"/>
+            </a:schemeClr>
+          </a:lnRef>
+          <a:fillRef idx="1">
+            <a:schemeClr val="accent1"/>
+          </a:fillRef>
+          <a:effectRef idx="0">
+            <a:schemeClr val="accent1"/>
+          </a:effectRef>
+          <a:fontRef idx="minor">
+            <a:schemeClr val="lt1"/>
+          </a:fontRef>
+        </p:style>
+        <p:txBody>
+          <a:bodyPr rtlCol="0" anchor="ctr"/>
+          <a:lstStyle/>
+          <a:p>
+            <a:pPr algn="ctr"/>
+            <a:r>
+              <a:rPr lang="ko-KR" altLang="en-US" sz="1600" b="1" dirty="0"/>
+              <a:t>기획의도</a:t>
+            </a:r>
+          </a:p>
+        </p:txBody>
+      </p:sp>
+      <p:sp>
+        <p:nvSpPr>
           <p:cNvPr id="4" name="TextBox 3">
             <a:extLst>
               <a:ext uri="{FF2B5EF4-FFF2-40B4-BE49-F238E27FC236}">
@@ -5086,7 +5613,7 @@
         </p:nvSpPr>
         <p:spPr>
           <a:xfrm>
-            <a:off x="1021976" y="4025152"/>
+            <a:off x="1021976" y="3720352"/>
             <a:ext cx="5432611" cy="646331"/>
           </a:xfrm>
           <a:prstGeom prst="rect">
@@ -5194,6 +5721,273 @@
           </a:prstGeom>
         </p:spPr>
       </p:pic>
+      <p:sp>
+        <p:nvSpPr>
+          <p:cNvPr id="5" name="모서리가 둥근 직사각형 20">
+            <a:extLst>
+              <a:ext uri="{FF2B5EF4-FFF2-40B4-BE49-F238E27FC236}">
+                <a16:creationId xmlns:a16="http://schemas.microsoft.com/office/drawing/2014/main" id="{99254802-67E4-4993-B09E-722FCA215FF1}"/>
+              </a:ext>
+            </a:extLst>
+          </p:cNvPr>
+          <p:cNvSpPr/>
+          <p:nvPr/>
+        </p:nvSpPr>
+        <p:spPr>
+          <a:xfrm>
+            <a:off x="1025234" y="4603458"/>
+            <a:ext cx="1884219" cy="429491"/>
+          </a:xfrm>
+          <a:prstGeom prst="roundRect">
+            <a:avLst/>
+          </a:prstGeom>
+          <a:solidFill>
+            <a:srgbClr val="00B050"/>
+          </a:solidFill>
+          <a:ln>
+            <a:noFill/>
+          </a:ln>
+        </p:spPr>
+        <p:style>
+          <a:lnRef idx="2">
+            <a:schemeClr val="accent1">
+              <a:shade val="50000"/>
+            </a:schemeClr>
+          </a:lnRef>
+          <a:fillRef idx="1">
+            <a:schemeClr val="accent1"/>
+          </a:fillRef>
+          <a:effectRef idx="0">
+            <a:schemeClr val="accent1"/>
+          </a:effectRef>
+          <a:fontRef idx="minor">
+            <a:schemeClr val="lt1"/>
+          </a:fontRef>
+        </p:style>
+        <p:txBody>
+          <a:bodyPr lIns="91440" tIns="45720" rIns="91440" bIns="45720" rtlCol="0" anchor="ctr"/>
+          <a:lstStyle/>
+          <a:p>
+            <a:pPr algn="ctr"/>
+            <a:r>
+              <a:rPr lang="ko-KR" altLang="en-US" sz="1600" b="1" dirty="0">
+                <a:ea typeface="맑은 고딕"/>
+              </a:rPr>
+              <a:t>역할</a:t>
+            </a:r>
+          </a:p>
+        </p:txBody>
+      </p:sp>
+      <p:sp>
+        <p:nvSpPr>
+          <p:cNvPr id="9" name="TextBox 8">
+            <a:extLst>
+              <a:ext uri="{FF2B5EF4-FFF2-40B4-BE49-F238E27FC236}">
+                <a16:creationId xmlns:a16="http://schemas.microsoft.com/office/drawing/2014/main" id="{DD596882-4C03-4A7D-ADE7-52D33A5F4753}"/>
+              </a:ext>
+            </a:extLst>
+          </p:cNvPr>
+          <p:cNvSpPr txBox="1"/>
+          <p:nvPr/>
+        </p:nvSpPr>
+        <p:spPr>
+          <a:xfrm>
+            <a:off x="1021976" y="5190563"/>
+            <a:ext cx="7064186" cy="1200329"/>
+          </a:xfrm>
+          <a:prstGeom prst="rect">
+            <a:avLst/>
+          </a:prstGeom>
+          <a:noFill/>
+        </p:spPr>
+        <p:txBody>
+          <a:bodyPr rot="0" spcFirstLastPara="0" vertOverflow="overflow" horzOverflow="overflow" vert="horz" wrap="square" lIns="91440" tIns="45720" rIns="91440" bIns="45720" numCol="1" spcCol="0" rtlCol="0" fromWordArt="0" anchor="t" anchorCtr="0" forceAA="0" compatLnSpc="1">
+            <a:prstTxWarp prst="textNoShape">
+              <a:avLst/>
+            </a:prstTxWarp>
+            <a:spAutoFit/>
+          </a:bodyPr>
+          <a:lstStyle/>
+          <a:p>
+            <a:r>
+              <a:rPr lang="ko-KR" dirty="0">
+                <a:ea typeface="+mn-lt"/>
+                <a:cs typeface="+mn-lt"/>
+              </a:rPr>
+              <a:t>- </a:t>
+            </a:r>
+            <a:r>
+              <a:rPr lang="en-US" altLang="ko-KR" dirty="0">
+                <a:ea typeface="+mn-lt"/>
+                <a:cs typeface="+mn-lt"/>
+              </a:rPr>
+              <a:t>Websocket</a:t>
+            </a:r>
+            <a:r>
+              <a:rPr lang="ko-KR" altLang="en-US" dirty="0">
+                <a:ea typeface="+mn-lt"/>
+                <a:cs typeface="+mn-lt"/>
+              </a:rPr>
+              <a:t>으로 </a:t>
+            </a:r>
+            <a:r>
+              <a:rPr lang="en-US" altLang="ko-KR" dirty="0">
+                <a:ea typeface="+mn-lt"/>
+                <a:cs typeface="+mn-lt"/>
+              </a:rPr>
+              <a:t>Python,</a:t>
+            </a:r>
+            <a:r>
+              <a:rPr lang="ko-KR" altLang="en-US" dirty="0">
+                <a:ea typeface="+mn-lt"/>
+                <a:cs typeface="+mn-lt"/>
+              </a:rPr>
+              <a:t> </a:t>
+            </a:r>
+            <a:r>
+              <a:rPr lang="en-US" altLang="ko-KR" dirty="0">
+                <a:ea typeface="+mn-lt"/>
+                <a:cs typeface="+mn-lt"/>
+              </a:rPr>
+              <a:t>Spring,</a:t>
+            </a:r>
+            <a:r>
+              <a:rPr lang="ko-KR" altLang="en-US">
+                <a:ea typeface="+mn-lt"/>
+                <a:cs typeface="+mn-lt"/>
+              </a:rPr>
+              <a:t> V</a:t>
+            </a:r>
+            <a:r>
+              <a:rPr lang="en-US" altLang="ko-KR">
+                <a:ea typeface="+mn-lt"/>
+                <a:cs typeface="+mn-lt"/>
+              </a:rPr>
+              <a:t>ue</a:t>
+            </a:r>
+            <a:r>
+              <a:rPr lang="ko-KR">
+                <a:ea typeface="+mn-lt"/>
+                <a:cs typeface="+mn-lt"/>
+              </a:rPr>
+              <a:t>.js</a:t>
+            </a:r>
+            <a:r>
+              <a:rPr lang="ko-KR" altLang="en-US" dirty="0">
+                <a:ea typeface="+mn-lt"/>
+                <a:cs typeface="+mn-lt"/>
+              </a:rPr>
+              <a:t> 간 </a:t>
+            </a:r>
+            <a:endParaRPr lang="ko-KR" altLang="en-US">
+              <a:ea typeface="맑은 고딕" panose="020B0503020000020004" pitchFamily="34" charset="-127"/>
+              <a:cs typeface="+mn-lt"/>
+            </a:endParaRPr>
+          </a:p>
+          <a:p>
+            <a:r>
+              <a:rPr lang="en-US" altLang="ko-KR">
+                <a:ea typeface="+mn-lt"/>
+                <a:cs typeface="+mn-lt"/>
+              </a:rPr>
+              <a:t>  STT</a:t>
+            </a:r>
+            <a:r>
+              <a:rPr lang="ko-KR" altLang="en-US">
+                <a:ea typeface="+mn-lt"/>
+                <a:cs typeface="+mn-lt"/>
+              </a:rPr>
+              <a:t> 명령어 전송 구현</a:t>
+            </a:r>
+            <a:endParaRPr lang="ko-KR">
+              <a:ea typeface="맑은 고딕"/>
+            </a:endParaRPr>
+          </a:p>
+          <a:p>
+            <a:r>
+              <a:rPr lang="en-US" altLang="ko-KR">
+                <a:ea typeface="+mn-lt"/>
+                <a:cs typeface="+mn-lt"/>
+              </a:rPr>
+              <a:t>-</a:t>
+            </a:r>
+            <a:r>
+              <a:rPr lang="ko-KR" altLang="en-US">
+                <a:ea typeface="+mn-lt"/>
+                <a:cs typeface="+mn-lt"/>
+              </a:rPr>
+              <a:t> 어르신의 </a:t>
+            </a:r>
+            <a:r>
+              <a:rPr lang="en-US" altLang="ko-KR">
+                <a:ea typeface="+mn-lt"/>
+                <a:cs typeface="+mn-lt"/>
+              </a:rPr>
+              <a:t>Random</a:t>
+            </a:r>
+            <a:r>
+              <a:rPr lang="ko-KR" altLang="en-US" dirty="0">
+                <a:ea typeface="+mn-lt"/>
+                <a:cs typeface="+mn-lt"/>
+              </a:rPr>
+              <a:t> </a:t>
+            </a:r>
+            <a:r>
+              <a:rPr lang="en-US" altLang="ko-KR">
+                <a:ea typeface="+mn-lt"/>
+                <a:cs typeface="+mn-lt"/>
+              </a:rPr>
+              <a:t>Question</a:t>
+            </a:r>
+            <a:r>
+              <a:rPr lang="ko-KR" altLang="en-US" dirty="0">
+                <a:ea typeface="+mn-lt"/>
+                <a:cs typeface="+mn-lt"/>
+              </a:rPr>
+              <a:t> </a:t>
+            </a:r>
+            <a:r>
+              <a:rPr lang="en-US" altLang="ko-KR">
+                <a:ea typeface="+mn-lt"/>
+                <a:cs typeface="+mn-lt"/>
+              </a:rPr>
+              <a:t>Get</a:t>
+            </a:r>
+            <a:r>
+              <a:rPr lang="ko-KR" altLang="en-US">
+                <a:ea typeface="+mn-lt"/>
+                <a:cs typeface="+mn-lt"/>
+              </a:rPr>
+              <a:t> 개발</a:t>
+            </a:r>
+            <a:endParaRPr lang="ko-KR"/>
+          </a:p>
+          <a:p>
+            <a:r>
+              <a:rPr lang="ko-KR">
+                <a:ea typeface="+mn-lt"/>
+                <a:cs typeface="+mn-lt"/>
+              </a:rPr>
+              <a:t>- </a:t>
+            </a:r>
+            <a:r>
+              <a:rPr lang="en-US" altLang="ko-KR">
+                <a:ea typeface="+mn-lt"/>
+                <a:cs typeface="+mn-lt"/>
+              </a:rPr>
+              <a:t>Docker</a:t>
+            </a:r>
+            <a:r>
+              <a:rPr lang="ko-KR" altLang="en-US">
+                <a:ea typeface="+mn-lt"/>
+                <a:cs typeface="+mn-lt"/>
+              </a:rPr>
+              <a:t> 구성을 통한 백엔드 서버 배포</a:t>
+            </a:r>
+            <a:endParaRPr lang="ko-KR"/>
+          </a:p>
+        </p:txBody>
+      </p:sp>
     </p:spTree>
     <p:extLst>
       <p:ext uri="{BB962C8B-B14F-4D97-AF65-F5344CB8AC3E}">

</xml_diff>